<commit_message>
feat: add scipt to train vggface
</commit_message>
<xml_diff>
--- a/Model Diagram/DEYOLOCLASS.pptx
+++ b/Model Diagram/DEYOLOCLASS.pptx
@@ -107,6 +107,11 @@
       </a:defRPr>
     </a:lvl9pPr>
   </p:defaultTextStyle>
+  <p:extLst>
+    <p:ext uri="{EFAFB233-063F-42B5-8137-9DF3F51BA10A}">
+      <p15:sldGuideLst xmlns:p15="http://schemas.microsoft.com/office/powerpoint/2012/main"/>
+    </p:ext>
+  </p:extLst>
 </p:presentation>
 </file>
 
@@ -259,7 +264,7 @@
           <a:p>
             <a:fld id="{17DD8062-6967-48D1-94BF-41EEED0BE1CA}" type="datetimeFigureOut">
               <a:rPr lang="en-ID" smtClean="0"/>
-              <a:t>17/12/2024</a:t>
+              <a:t>18/12/2024</a:t>
             </a:fld>
             <a:endParaRPr lang="en-ID"/>
           </a:p>
@@ -459,7 +464,7 @@
           <a:p>
             <a:fld id="{17DD8062-6967-48D1-94BF-41EEED0BE1CA}" type="datetimeFigureOut">
               <a:rPr lang="en-ID" smtClean="0"/>
-              <a:t>17/12/2024</a:t>
+              <a:t>18/12/2024</a:t>
             </a:fld>
             <a:endParaRPr lang="en-ID"/>
           </a:p>
@@ -669,7 +674,7 @@
           <a:p>
             <a:fld id="{17DD8062-6967-48D1-94BF-41EEED0BE1CA}" type="datetimeFigureOut">
               <a:rPr lang="en-ID" smtClean="0"/>
-              <a:t>17/12/2024</a:t>
+              <a:t>18/12/2024</a:t>
             </a:fld>
             <a:endParaRPr lang="en-ID"/>
           </a:p>
@@ -869,7 +874,7 @@
           <a:p>
             <a:fld id="{17DD8062-6967-48D1-94BF-41EEED0BE1CA}" type="datetimeFigureOut">
               <a:rPr lang="en-ID" smtClean="0"/>
-              <a:t>17/12/2024</a:t>
+              <a:t>18/12/2024</a:t>
             </a:fld>
             <a:endParaRPr lang="en-ID"/>
           </a:p>
@@ -1145,7 +1150,7 @@
           <a:p>
             <a:fld id="{17DD8062-6967-48D1-94BF-41EEED0BE1CA}" type="datetimeFigureOut">
               <a:rPr lang="en-ID" smtClean="0"/>
-              <a:t>17/12/2024</a:t>
+              <a:t>18/12/2024</a:t>
             </a:fld>
             <a:endParaRPr lang="en-ID"/>
           </a:p>
@@ -1413,7 +1418,7 @@
           <a:p>
             <a:fld id="{17DD8062-6967-48D1-94BF-41EEED0BE1CA}" type="datetimeFigureOut">
               <a:rPr lang="en-ID" smtClean="0"/>
-              <a:t>17/12/2024</a:t>
+              <a:t>18/12/2024</a:t>
             </a:fld>
             <a:endParaRPr lang="en-ID"/>
           </a:p>
@@ -1828,7 +1833,7 @@
           <a:p>
             <a:fld id="{17DD8062-6967-48D1-94BF-41EEED0BE1CA}" type="datetimeFigureOut">
               <a:rPr lang="en-ID" smtClean="0"/>
-              <a:t>17/12/2024</a:t>
+              <a:t>18/12/2024</a:t>
             </a:fld>
             <a:endParaRPr lang="en-ID"/>
           </a:p>
@@ -1970,7 +1975,7 @@
           <a:p>
             <a:fld id="{17DD8062-6967-48D1-94BF-41EEED0BE1CA}" type="datetimeFigureOut">
               <a:rPr lang="en-ID" smtClean="0"/>
-              <a:t>17/12/2024</a:t>
+              <a:t>18/12/2024</a:t>
             </a:fld>
             <a:endParaRPr lang="en-ID"/>
           </a:p>
@@ -2083,7 +2088,7 @@
           <a:p>
             <a:fld id="{17DD8062-6967-48D1-94BF-41EEED0BE1CA}" type="datetimeFigureOut">
               <a:rPr lang="en-ID" smtClean="0"/>
-              <a:t>17/12/2024</a:t>
+              <a:t>18/12/2024</a:t>
             </a:fld>
             <a:endParaRPr lang="en-ID"/>
           </a:p>
@@ -2396,7 +2401,7 @@
           <a:p>
             <a:fld id="{17DD8062-6967-48D1-94BF-41EEED0BE1CA}" type="datetimeFigureOut">
               <a:rPr lang="en-ID" smtClean="0"/>
-              <a:t>17/12/2024</a:t>
+              <a:t>18/12/2024</a:t>
             </a:fld>
             <a:endParaRPr lang="en-ID"/>
           </a:p>
@@ -2685,7 +2690,7 @@
           <a:p>
             <a:fld id="{17DD8062-6967-48D1-94BF-41EEED0BE1CA}" type="datetimeFigureOut">
               <a:rPr lang="en-ID" smtClean="0"/>
-              <a:t>17/12/2024</a:t>
+              <a:t>18/12/2024</a:t>
             </a:fld>
             <a:endParaRPr lang="en-ID"/>
           </a:p>
@@ -2928,7 +2933,7 @@
           <a:p>
             <a:fld id="{17DD8062-6967-48D1-94BF-41EEED0BE1CA}" type="datetimeFigureOut">
               <a:rPr lang="en-ID" smtClean="0"/>
-              <a:t>17/12/2024</a:t>
+              <a:t>18/12/2024</a:t>
             </a:fld>
             <a:endParaRPr lang="en-ID"/>
           </a:p>
@@ -4089,7 +4094,7 @@
         </p:nvSpPr>
         <p:spPr>
           <a:xfrm>
-            <a:off x="5330138" y="2032590"/>
+            <a:off x="5452367" y="2032168"/>
             <a:ext cx="446172" cy="369332"/>
           </a:xfrm>
           <a:prstGeom prst="rect">
@@ -4125,7 +4130,7 @@
         </p:nvSpPr>
         <p:spPr>
           <a:xfrm>
-            <a:off x="5330138" y="4178910"/>
+            <a:off x="5439027" y="4216715"/>
             <a:ext cx="446172" cy="369332"/>
           </a:xfrm>
           <a:prstGeom prst="rect">
@@ -4441,7 +4446,7 @@
           </a:xfrm>
           <a:prstGeom prst="bentConnector5">
             <a:avLst>
-              <a:gd name="adj1" fmla="val 157590"/>
+              <a:gd name="adj1" fmla="val 90734"/>
               <a:gd name="adj2" fmla="val 49733"/>
               <a:gd name="adj3" fmla="val -57590"/>
             </a:avLst>

</xml_diff>

<commit_message>
feat: add resnet, shufflenet, and mobilenet
</commit_message>
<xml_diff>
--- a/Model Diagram/DEYOLOCLASS.pptx
+++ b/Model Diagram/DEYOLOCLASS.pptx
@@ -264,7 +264,7 @@
           <a:p>
             <a:fld id="{17DD8062-6967-48D1-94BF-41EEED0BE1CA}" type="datetimeFigureOut">
               <a:rPr lang="en-ID" smtClean="0"/>
-              <a:t>18/12/2024</a:t>
+              <a:t>24/12/2024</a:t>
             </a:fld>
             <a:endParaRPr lang="en-ID"/>
           </a:p>
@@ -464,7 +464,7 @@
           <a:p>
             <a:fld id="{17DD8062-6967-48D1-94BF-41EEED0BE1CA}" type="datetimeFigureOut">
               <a:rPr lang="en-ID" smtClean="0"/>
-              <a:t>18/12/2024</a:t>
+              <a:t>24/12/2024</a:t>
             </a:fld>
             <a:endParaRPr lang="en-ID"/>
           </a:p>
@@ -674,7 +674,7 @@
           <a:p>
             <a:fld id="{17DD8062-6967-48D1-94BF-41EEED0BE1CA}" type="datetimeFigureOut">
               <a:rPr lang="en-ID" smtClean="0"/>
-              <a:t>18/12/2024</a:t>
+              <a:t>24/12/2024</a:t>
             </a:fld>
             <a:endParaRPr lang="en-ID"/>
           </a:p>
@@ -874,7 +874,7 @@
           <a:p>
             <a:fld id="{17DD8062-6967-48D1-94BF-41EEED0BE1CA}" type="datetimeFigureOut">
               <a:rPr lang="en-ID" smtClean="0"/>
-              <a:t>18/12/2024</a:t>
+              <a:t>24/12/2024</a:t>
             </a:fld>
             <a:endParaRPr lang="en-ID"/>
           </a:p>
@@ -1150,7 +1150,7 @@
           <a:p>
             <a:fld id="{17DD8062-6967-48D1-94BF-41EEED0BE1CA}" type="datetimeFigureOut">
               <a:rPr lang="en-ID" smtClean="0"/>
-              <a:t>18/12/2024</a:t>
+              <a:t>24/12/2024</a:t>
             </a:fld>
             <a:endParaRPr lang="en-ID"/>
           </a:p>
@@ -1418,7 +1418,7 @@
           <a:p>
             <a:fld id="{17DD8062-6967-48D1-94BF-41EEED0BE1CA}" type="datetimeFigureOut">
               <a:rPr lang="en-ID" smtClean="0"/>
-              <a:t>18/12/2024</a:t>
+              <a:t>24/12/2024</a:t>
             </a:fld>
             <a:endParaRPr lang="en-ID"/>
           </a:p>
@@ -1833,7 +1833,7 @@
           <a:p>
             <a:fld id="{17DD8062-6967-48D1-94BF-41EEED0BE1CA}" type="datetimeFigureOut">
               <a:rPr lang="en-ID" smtClean="0"/>
-              <a:t>18/12/2024</a:t>
+              <a:t>24/12/2024</a:t>
             </a:fld>
             <a:endParaRPr lang="en-ID"/>
           </a:p>
@@ -1975,7 +1975,7 @@
           <a:p>
             <a:fld id="{17DD8062-6967-48D1-94BF-41EEED0BE1CA}" type="datetimeFigureOut">
               <a:rPr lang="en-ID" smtClean="0"/>
-              <a:t>18/12/2024</a:t>
+              <a:t>24/12/2024</a:t>
             </a:fld>
             <a:endParaRPr lang="en-ID"/>
           </a:p>
@@ -2088,7 +2088,7 @@
           <a:p>
             <a:fld id="{17DD8062-6967-48D1-94BF-41EEED0BE1CA}" type="datetimeFigureOut">
               <a:rPr lang="en-ID" smtClean="0"/>
-              <a:t>18/12/2024</a:t>
+              <a:t>24/12/2024</a:t>
             </a:fld>
             <a:endParaRPr lang="en-ID"/>
           </a:p>
@@ -2401,7 +2401,7 @@
           <a:p>
             <a:fld id="{17DD8062-6967-48D1-94BF-41EEED0BE1CA}" type="datetimeFigureOut">
               <a:rPr lang="en-ID" smtClean="0"/>
-              <a:t>18/12/2024</a:t>
+              <a:t>24/12/2024</a:t>
             </a:fld>
             <a:endParaRPr lang="en-ID"/>
           </a:p>
@@ -2690,7 +2690,7 @@
           <a:p>
             <a:fld id="{17DD8062-6967-48D1-94BF-41EEED0BE1CA}" type="datetimeFigureOut">
               <a:rPr lang="en-ID" smtClean="0"/>
-              <a:t>18/12/2024</a:t>
+              <a:t>24/12/2024</a:t>
             </a:fld>
             <a:endParaRPr lang="en-ID"/>
           </a:p>
@@ -2933,7 +2933,7 @@
           <a:p>
             <a:fld id="{17DD8062-6967-48D1-94BF-41EEED0BE1CA}" type="datetimeFigureOut">
               <a:rPr lang="en-ID" smtClean="0"/>
-              <a:t>18/12/2024</a:t>
+              <a:t>24/12/2024</a:t>
             </a:fld>
             <a:endParaRPr lang="en-ID"/>
           </a:p>
@@ -3629,15 +3629,15 @@
         </p:spPr>
         <p:style>
           <a:lnRef idx="2">
-            <a:schemeClr val="accent1">
+            <a:schemeClr val="accent2">
               <a:shade val="50000"/>
             </a:schemeClr>
           </a:lnRef>
           <a:fillRef idx="1">
-            <a:schemeClr val="accent1"/>
+            <a:schemeClr val="accent2"/>
           </a:fillRef>
           <a:effectRef idx="0">
-            <a:schemeClr val="accent1"/>
+            <a:schemeClr val="accent2"/>
           </a:effectRef>
           <a:fontRef idx="minor">
             <a:schemeClr val="lt1"/>
@@ -3679,15 +3679,15 @@
         </p:spPr>
         <p:style>
           <a:lnRef idx="2">
-            <a:schemeClr val="accent1">
+            <a:schemeClr val="accent2">
               <a:shade val="50000"/>
             </a:schemeClr>
           </a:lnRef>
           <a:fillRef idx="1">
-            <a:schemeClr val="accent1"/>
+            <a:schemeClr val="accent2"/>
           </a:fillRef>
           <a:effectRef idx="0">
-            <a:schemeClr val="accent1"/>
+            <a:schemeClr val="accent2"/>
           </a:effectRef>
           <a:fontRef idx="minor">
             <a:schemeClr val="lt1"/>
@@ -3729,15 +3729,15 @@
         </p:spPr>
         <p:style>
           <a:lnRef idx="2">
-            <a:schemeClr val="accent1">
+            <a:schemeClr val="accent2">
               <a:shade val="50000"/>
             </a:schemeClr>
           </a:lnRef>
           <a:fillRef idx="1">
-            <a:schemeClr val="accent1"/>
+            <a:schemeClr val="accent2"/>
           </a:fillRef>
           <a:effectRef idx="0">
-            <a:schemeClr val="accent1"/>
+            <a:schemeClr val="accent2"/>
           </a:effectRef>
           <a:fontRef idx="minor">
             <a:schemeClr val="lt1"/>
@@ -4247,15 +4247,15 @@
         </p:spPr>
         <p:style>
           <a:lnRef idx="2">
-            <a:schemeClr val="accent1">
+            <a:schemeClr val="accent4">
               <a:shade val="50000"/>
             </a:schemeClr>
           </a:lnRef>
           <a:fillRef idx="1">
-            <a:schemeClr val="accent1"/>
+            <a:schemeClr val="accent4"/>
           </a:fillRef>
           <a:effectRef idx="0">
-            <a:schemeClr val="accent1"/>
+            <a:schemeClr val="accent4"/>
           </a:effectRef>
           <a:fontRef idx="minor">
             <a:schemeClr val="lt1"/>
@@ -4297,15 +4297,15 @@
         </p:spPr>
         <p:style>
           <a:lnRef idx="2">
-            <a:schemeClr val="accent1">
+            <a:schemeClr val="accent4">
               <a:shade val="50000"/>
             </a:schemeClr>
           </a:lnRef>
           <a:fillRef idx="1">
-            <a:schemeClr val="accent1"/>
+            <a:schemeClr val="accent4"/>
           </a:fillRef>
           <a:effectRef idx="0">
-            <a:schemeClr val="accent1"/>
+            <a:schemeClr val="accent4"/>
           </a:effectRef>
           <a:fontRef idx="minor">
             <a:schemeClr val="lt1"/>
@@ -4347,15 +4347,15 @@
         </p:spPr>
         <p:style>
           <a:lnRef idx="2">
-            <a:schemeClr val="accent1">
+            <a:schemeClr val="accent4">
               <a:shade val="50000"/>
             </a:schemeClr>
           </a:lnRef>
           <a:fillRef idx="1">
-            <a:schemeClr val="accent1"/>
+            <a:schemeClr val="accent4"/>
           </a:fillRef>
           <a:effectRef idx="0">
-            <a:schemeClr val="accent1"/>
+            <a:schemeClr val="accent4"/>
           </a:effectRef>
           <a:fontRef idx="minor">
             <a:schemeClr val="lt1"/>
@@ -4397,15 +4397,15 @@
         </p:spPr>
         <p:style>
           <a:lnRef idx="2">
-            <a:schemeClr val="accent1">
+            <a:schemeClr val="accent4">
               <a:shade val="50000"/>
             </a:schemeClr>
           </a:lnRef>
           <a:fillRef idx="1">
-            <a:schemeClr val="accent1"/>
+            <a:schemeClr val="accent4"/>
           </a:fillRef>
           <a:effectRef idx="0">
-            <a:schemeClr val="accent1"/>
+            <a:schemeClr val="accent4"/>
           </a:effectRef>
           <a:fontRef idx="minor">
             <a:schemeClr val="lt1"/>
@@ -4539,15 +4539,15 @@
         </p:spPr>
         <p:style>
           <a:lnRef idx="2">
-            <a:schemeClr val="accent1">
+            <a:schemeClr val="accent6">
               <a:shade val="50000"/>
             </a:schemeClr>
           </a:lnRef>
           <a:fillRef idx="1">
-            <a:schemeClr val="accent1"/>
+            <a:schemeClr val="accent6"/>
           </a:fillRef>
           <a:effectRef idx="0">
-            <a:schemeClr val="accent1"/>
+            <a:schemeClr val="accent6"/>
           </a:effectRef>
           <a:fontRef idx="minor">
             <a:schemeClr val="lt1"/>
@@ -4589,15 +4589,15 @@
         </p:spPr>
         <p:style>
           <a:lnRef idx="2">
-            <a:schemeClr val="accent1">
+            <a:schemeClr val="accent6">
               <a:shade val="50000"/>
             </a:schemeClr>
           </a:lnRef>
           <a:fillRef idx="1">
-            <a:schemeClr val="accent1"/>
+            <a:schemeClr val="accent6"/>
           </a:fillRef>
           <a:effectRef idx="0">
-            <a:schemeClr val="accent1"/>
+            <a:schemeClr val="accent6"/>
           </a:effectRef>
           <a:fontRef idx="minor">
             <a:schemeClr val="lt1"/>
@@ -4639,15 +4639,15 @@
         </p:spPr>
         <p:style>
           <a:lnRef idx="2">
-            <a:schemeClr val="accent1">
+            <a:schemeClr val="accent6">
               <a:shade val="50000"/>
             </a:schemeClr>
           </a:lnRef>
           <a:fillRef idx="1">
-            <a:schemeClr val="accent1"/>
+            <a:schemeClr val="accent6"/>
           </a:fillRef>
           <a:effectRef idx="0">
-            <a:schemeClr val="accent1"/>
+            <a:schemeClr val="accent6"/>
           </a:effectRef>
           <a:fontRef idx="minor">
             <a:schemeClr val="lt1"/>
@@ -4689,15 +4689,15 @@
         </p:spPr>
         <p:style>
           <a:lnRef idx="2">
-            <a:schemeClr val="accent1">
+            <a:schemeClr val="dk1">
               <a:shade val="50000"/>
             </a:schemeClr>
           </a:lnRef>
           <a:fillRef idx="1">
-            <a:schemeClr val="accent1"/>
+            <a:schemeClr val="dk1"/>
           </a:fillRef>
           <a:effectRef idx="0">
-            <a:schemeClr val="accent1"/>
+            <a:schemeClr val="dk1"/>
           </a:effectRef>
           <a:fontRef idx="minor">
             <a:schemeClr val="lt1"/>
@@ -4739,15 +4739,15 @@
         </p:spPr>
         <p:style>
           <a:lnRef idx="2">
-            <a:schemeClr val="accent1">
+            <a:schemeClr val="dk1">
               <a:shade val="50000"/>
             </a:schemeClr>
           </a:lnRef>
           <a:fillRef idx="1">
-            <a:schemeClr val="accent1"/>
+            <a:schemeClr val="dk1"/>
           </a:fillRef>
           <a:effectRef idx="0">
-            <a:schemeClr val="accent1"/>
+            <a:schemeClr val="dk1"/>
           </a:effectRef>
           <a:fontRef idx="minor">
             <a:schemeClr val="lt1"/>
@@ -5005,6 +5005,48 @@
           </a:p>
         </p:txBody>
       </p:sp>
+      <p:cxnSp>
+        <p:nvCxnSpPr>
+          <p:cNvPr id="3" name="Straight Arrow Connector 2">
+            <a:extLst>
+              <a:ext uri="{FF2B5EF4-FFF2-40B4-BE49-F238E27FC236}">
+                <a16:creationId xmlns:a16="http://schemas.microsoft.com/office/drawing/2014/main" id="{66442E58-CD8A-4125-AC6B-AA1ACA76CD5D}"/>
+              </a:ext>
+            </a:extLst>
+          </p:cNvPr>
+          <p:cNvCxnSpPr>
+            <a:stCxn id="17" idx="0"/>
+            <a:endCxn id="57" idx="2"/>
+          </p:cNvCxnSpPr>
+          <p:nvPr/>
+        </p:nvCxnSpPr>
+        <p:spPr>
+          <a:xfrm>
+            <a:off x="7421934" y="3469524"/>
+            <a:ext cx="602950" cy="3832"/>
+          </a:xfrm>
+          <a:prstGeom prst="straightConnector1">
+            <a:avLst/>
+          </a:prstGeom>
+          <a:ln>
+            <a:tailEnd type="triangle"/>
+          </a:ln>
+        </p:spPr>
+        <p:style>
+          <a:lnRef idx="1">
+            <a:schemeClr val="accent1"/>
+          </a:lnRef>
+          <a:fillRef idx="0">
+            <a:schemeClr val="accent1"/>
+          </a:fillRef>
+          <a:effectRef idx="0">
+            <a:schemeClr val="accent1"/>
+          </a:effectRef>
+          <a:fontRef idx="minor">
+            <a:schemeClr val="tx1"/>
+          </a:fontRef>
+        </p:style>
+      </p:cxnSp>
     </p:spTree>
     <p:extLst>
       <p:ext uri="{BB962C8B-B14F-4D97-AF65-F5344CB8AC3E}">

</xml_diff>